<commit_message>
nano plasma theory update
</commit_message>
<xml_diff>
--- a/images/pickup-source.pptx
+++ b/images/pickup-source.pptx
@@ -106,7 +106,18 @@
   </p:defaultTextStyle>
   <p:extLst>
     <p:ext uri="{EFAFB233-063F-42B5-8137-9DF3F51BA10A}">
-      <p15:sldGuideLst xmlns:p15="http://schemas.microsoft.com/office/powerpoint/2012/main" xmlns=""/>
+      <p15:sldGuideLst xmlns:p15="http://schemas.microsoft.com/office/powerpoint/2012/main">
+        <p15:guide id="1" orient="horz" pos="2160">
+          <p15:clr>
+            <a:srgbClr val="A4A3A4"/>
+          </p15:clr>
+        </p15:guide>
+        <p15:guide id="2" pos="3840">
+          <p15:clr>
+            <a:srgbClr val="A4A3A4"/>
+          </p15:clr>
+        </p15:guide>
+      </p15:sldGuideLst>
     </p:ext>
   </p:extLst>
 </p:presentation>
@@ -243,7 +254,7 @@
           <a:p>
             <a:fld id="{11DF4037-C77C-4485-A1A7-A21C0C2A48B2}" type="datetimeFigureOut">
               <a:rPr lang="en-US" smtClean="0"/>
-              <a:t>7/29/16</a:t>
+              <a:t>8/15/2016</a:t>
             </a:fld>
             <a:endParaRPr lang="en-US"/>
           </a:p>
@@ -285,7 +296,7 @@
           <a:p>
             <a:fld id="{3463B86D-F204-47AF-BB61-01E16E05AA28}" type="slidenum">
               <a:rPr lang="en-US" smtClean="0"/>
-              <a:t>‹Nr.›</a:t>
+              <a:t>‹#›</a:t>
             </a:fld>
             <a:endParaRPr lang="en-US"/>
           </a:p>
@@ -413,7 +424,7 @@
           <a:p>
             <a:fld id="{11DF4037-C77C-4485-A1A7-A21C0C2A48B2}" type="datetimeFigureOut">
               <a:rPr lang="en-US" smtClean="0"/>
-              <a:t>7/29/16</a:t>
+              <a:t>8/15/2016</a:t>
             </a:fld>
             <a:endParaRPr lang="en-US"/>
           </a:p>
@@ -455,7 +466,7 @@
           <a:p>
             <a:fld id="{3463B86D-F204-47AF-BB61-01E16E05AA28}" type="slidenum">
               <a:rPr lang="en-US" smtClean="0"/>
-              <a:t>‹Nr.›</a:t>
+              <a:t>‹#›</a:t>
             </a:fld>
             <a:endParaRPr lang="en-US"/>
           </a:p>
@@ -593,7 +604,7 @@
           <a:p>
             <a:fld id="{11DF4037-C77C-4485-A1A7-A21C0C2A48B2}" type="datetimeFigureOut">
               <a:rPr lang="en-US" smtClean="0"/>
-              <a:t>7/29/16</a:t>
+              <a:t>8/15/2016</a:t>
             </a:fld>
             <a:endParaRPr lang="en-US"/>
           </a:p>
@@ -635,7 +646,7 @@
           <a:p>
             <a:fld id="{3463B86D-F204-47AF-BB61-01E16E05AA28}" type="slidenum">
               <a:rPr lang="en-US" smtClean="0"/>
-              <a:t>‹Nr.›</a:t>
+              <a:t>‹#›</a:t>
             </a:fld>
             <a:endParaRPr lang="en-US"/>
           </a:p>
@@ -763,7 +774,7 @@
           <a:p>
             <a:fld id="{11DF4037-C77C-4485-A1A7-A21C0C2A48B2}" type="datetimeFigureOut">
               <a:rPr lang="en-US" smtClean="0"/>
-              <a:t>7/29/16</a:t>
+              <a:t>8/15/2016</a:t>
             </a:fld>
             <a:endParaRPr lang="en-US"/>
           </a:p>
@@ -805,7 +816,7 @@
           <a:p>
             <a:fld id="{3463B86D-F204-47AF-BB61-01E16E05AA28}" type="slidenum">
               <a:rPr lang="en-US" smtClean="0"/>
-              <a:t>‹Nr.›</a:t>
+              <a:t>‹#›</a:t>
             </a:fld>
             <a:endParaRPr lang="en-US"/>
           </a:p>
@@ -1009,7 +1020,7 @@
           <a:p>
             <a:fld id="{11DF4037-C77C-4485-A1A7-A21C0C2A48B2}" type="datetimeFigureOut">
               <a:rPr lang="en-US" smtClean="0"/>
-              <a:t>7/29/16</a:t>
+              <a:t>8/15/2016</a:t>
             </a:fld>
             <a:endParaRPr lang="en-US"/>
           </a:p>
@@ -1051,7 +1062,7 @@
           <a:p>
             <a:fld id="{3463B86D-F204-47AF-BB61-01E16E05AA28}" type="slidenum">
               <a:rPr lang="en-US" smtClean="0"/>
-              <a:t>‹Nr.›</a:t>
+              <a:t>‹#›</a:t>
             </a:fld>
             <a:endParaRPr lang="en-US"/>
           </a:p>
@@ -1241,7 +1252,7 @@
           <a:p>
             <a:fld id="{11DF4037-C77C-4485-A1A7-A21C0C2A48B2}" type="datetimeFigureOut">
               <a:rPr lang="en-US" smtClean="0"/>
-              <a:t>7/29/16</a:t>
+              <a:t>8/15/2016</a:t>
             </a:fld>
             <a:endParaRPr lang="en-US"/>
           </a:p>
@@ -1283,7 +1294,7 @@
           <a:p>
             <a:fld id="{3463B86D-F204-47AF-BB61-01E16E05AA28}" type="slidenum">
               <a:rPr lang="en-US" smtClean="0"/>
-              <a:t>‹Nr.›</a:t>
+              <a:t>‹#›</a:t>
             </a:fld>
             <a:endParaRPr lang="en-US"/>
           </a:p>
@@ -1608,7 +1619,7 @@
           <a:p>
             <a:fld id="{11DF4037-C77C-4485-A1A7-A21C0C2A48B2}" type="datetimeFigureOut">
               <a:rPr lang="en-US" smtClean="0"/>
-              <a:t>7/29/16</a:t>
+              <a:t>8/15/2016</a:t>
             </a:fld>
             <a:endParaRPr lang="en-US"/>
           </a:p>
@@ -1650,7 +1661,7 @@
           <a:p>
             <a:fld id="{3463B86D-F204-47AF-BB61-01E16E05AA28}" type="slidenum">
               <a:rPr lang="en-US" smtClean="0"/>
-              <a:t>‹Nr.›</a:t>
+              <a:t>‹#›</a:t>
             </a:fld>
             <a:endParaRPr lang="en-US"/>
           </a:p>
@@ -1726,7 +1737,7 @@
           <a:p>
             <a:fld id="{11DF4037-C77C-4485-A1A7-A21C0C2A48B2}" type="datetimeFigureOut">
               <a:rPr lang="en-US" smtClean="0"/>
-              <a:t>7/29/16</a:t>
+              <a:t>8/15/2016</a:t>
             </a:fld>
             <a:endParaRPr lang="en-US"/>
           </a:p>
@@ -1768,7 +1779,7 @@
           <a:p>
             <a:fld id="{3463B86D-F204-47AF-BB61-01E16E05AA28}" type="slidenum">
               <a:rPr lang="en-US" smtClean="0"/>
-              <a:t>‹Nr.›</a:t>
+              <a:t>‹#›</a:t>
             </a:fld>
             <a:endParaRPr lang="en-US"/>
           </a:p>
@@ -1821,7 +1832,7 @@
           <a:p>
             <a:fld id="{11DF4037-C77C-4485-A1A7-A21C0C2A48B2}" type="datetimeFigureOut">
               <a:rPr lang="en-US" smtClean="0"/>
-              <a:t>7/29/16</a:t>
+              <a:t>8/15/2016</a:t>
             </a:fld>
             <a:endParaRPr lang="en-US"/>
           </a:p>
@@ -1863,7 +1874,7 @@
           <a:p>
             <a:fld id="{3463B86D-F204-47AF-BB61-01E16E05AA28}" type="slidenum">
               <a:rPr lang="en-US" smtClean="0"/>
-              <a:t>‹Nr.›</a:t>
+              <a:t>‹#›</a:t>
             </a:fld>
             <a:endParaRPr lang="en-US"/>
           </a:p>
@@ -2098,7 +2109,7 @@
           <a:p>
             <a:fld id="{11DF4037-C77C-4485-A1A7-A21C0C2A48B2}" type="datetimeFigureOut">
               <a:rPr lang="en-US" smtClean="0"/>
-              <a:t>7/29/16</a:t>
+              <a:t>8/15/2016</a:t>
             </a:fld>
             <a:endParaRPr lang="en-US"/>
           </a:p>
@@ -2140,7 +2151,7 @@
           <a:p>
             <a:fld id="{3463B86D-F204-47AF-BB61-01E16E05AA28}" type="slidenum">
               <a:rPr lang="en-US" smtClean="0"/>
-              <a:t>‹Nr.›</a:t>
+              <a:t>‹#›</a:t>
             </a:fld>
             <a:endParaRPr lang="en-US"/>
           </a:p>
@@ -2351,7 +2362,7 @@
           <a:p>
             <a:fld id="{11DF4037-C77C-4485-A1A7-A21C0C2A48B2}" type="datetimeFigureOut">
               <a:rPr lang="en-US" smtClean="0"/>
-              <a:t>7/29/16</a:t>
+              <a:t>8/15/2016</a:t>
             </a:fld>
             <a:endParaRPr lang="en-US"/>
           </a:p>
@@ -2393,7 +2404,7 @@
           <a:p>
             <a:fld id="{3463B86D-F204-47AF-BB61-01E16E05AA28}" type="slidenum">
               <a:rPr lang="en-US" smtClean="0"/>
-              <a:t>‹Nr.›</a:t>
+              <a:t>‹#›</a:t>
             </a:fld>
             <a:endParaRPr lang="en-US"/>
           </a:p>
@@ -2564,7 +2575,7 @@
           <a:p>
             <a:fld id="{11DF4037-C77C-4485-A1A7-A21C0C2A48B2}" type="datetimeFigureOut">
               <a:rPr lang="en-US" smtClean="0"/>
-              <a:t>7/29/16</a:t>
+              <a:t>8/15/2016</a:t>
             </a:fld>
             <a:endParaRPr lang="en-US"/>
           </a:p>
@@ -2642,7 +2653,7 @@
           <a:p>
             <a:fld id="{3463B86D-F204-47AF-BB61-01E16E05AA28}" type="slidenum">
               <a:rPr lang="en-US" smtClean="0"/>
-              <a:t>‹Nr.›</a:t>
+              <a:t>‹#›</a:t>
             </a:fld>
             <a:endParaRPr lang="en-US"/>
           </a:p>
@@ -4241,7 +4252,7 @@
         <p:spPr>
           <a:xfrm>
             <a:off x="2539913" y="3843655"/>
-            <a:ext cx="7753419" cy="16712"/>
+            <a:ext cx="8181860" cy="17145"/>
           </a:xfrm>
           <a:prstGeom prst="straightConnector1">
             <a:avLst/>
@@ -4780,6 +4791,168 @@
         <p:spPr>
           <a:xfrm>
             <a:off x="7175500" y="5410200"/>
+            <a:ext cx="1019292" cy="369332"/>
+          </a:xfrm>
+          <a:prstGeom prst="rect">
+            <a:avLst/>
+          </a:prstGeom>
+          <a:noFill/>
+        </p:spPr>
+        <p:txBody>
+          <a:bodyPr wrap="none" rtlCol="0">
+            <a:spAutoFit/>
+          </a:bodyPr>
+          <a:lstStyle/>
+          <a:p>
+            <a:r>
+              <a:rPr lang="en-US" dirty="0" smtClean="0"/>
+              <a:t>To pump</a:t>
+            </a:r>
+            <a:endParaRPr lang="en-US" dirty="0"/>
+          </a:p>
+        </p:txBody>
+      </p:sp>
+      <p:cxnSp>
+        <p:nvCxnSpPr>
+          <p:cNvPr id="3" name="Straight Connector 2"/>
+          <p:cNvCxnSpPr/>
+          <p:nvPr/>
+        </p:nvCxnSpPr>
+        <p:spPr>
+          <a:xfrm flipH="1">
+            <a:off x="10835014" y="1892300"/>
+            <a:ext cx="25052" cy="3898900"/>
+          </a:xfrm>
+          <a:prstGeom prst="line">
+            <a:avLst/>
+          </a:prstGeom>
+        </p:spPr>
+        <p:style>
+          <a:lnRef idx="1">
+            <a:schemeClr val="accent1"/>
+          </a:lnRef>
+          <a:fillRef idx="0">
+            <a:schemeClr val="accent1"/>
+          </a:fillRef>
+          <a:effectRef idx="0">
+            <a:schemeClr val="accent1"/>
+          </a:effectRef>
+          <a:fontRef idx="minor">
+            <a:schemeClr val="tx1"/>
+          </a:fontRef>
+        </p:style>
+      </p:cxnSp>
+      <p:sp>
+        <p:nvSpPr>
+          <p:cNvPr id="8" name="TextBox 7"/>
+          <p:cNvSpPr txBox="1"/>
+          <p:nvPr/>
+        </p:nvSpPr>
+        <p:spPr>
+          <a:xfrm>
+            <a:off x="9757392" y="1930400"/>
+            <a:ext cx="1102674" cy="369332"/>
+          </a:xfrm>
+          <a:prstGeom prst="rect">
+            <a:avLst/>
+          </a:prstGeom>
+          <a:noFill/>
+        </p:spPr>
+        <p:txBody>
+          <a:bodyPr wrap="none" rtlCol="0">
+            <a:spAutoFit/>
+          </a:bodyPr>
+          <a:lstStyle/>
+          <a:p>
+            <a:r>
+              <a:rPr lang="en-US" dirty="0" smtClean="0"/>
+              <a:t>Detection</a:t>
+            </a:r>
+            <a:endParaRPr lang="en-US" dirty="0"/>
+          </a:p>
+        </p:txBody>
+      </p:sp>
+      <p:sp>
+        <p:nvSpPr>
+          <p:cNvPr id="10" name="TextBox 9"/>
+          <p:cNvSpPr txBox="1"/>
+          <p:nvPr/>
+        </p:nvSpPr>
+        <p:spPr>
+          <a:xfrm>
+            <a:off x="9995484" y="3323081"/>
+            <a:ext cx="726289" cy="369332"/>
+          </a:xfrm>
+          <a:prstGeom prst="rect">
+            <a:avLst/>
+          </a:prstGeom>
+          <a:noFill/>
+        </p:spPr>
+        <p:txBody>
+          <a:bodyPr wrap="none" rtlCol="0">
+            <a:spAutoFit/>
+          </a:bodyPr>
+          <a:lstStyle/>
+          <a:p>
+            <a:r>
+              <a:rPr lang="en-US" dirty="0" err="1" smtClean="0"/>
+              <a:t>p</a:t>
+            </a:r>
+            <a:r>
+              <a:rPr lang="en-US" baseline="-25000" dirty="0" err="1" smtClean="0"/>
+              <a:t>cluster</a:t>
+            </a:r>
+            <a:endParaRPr lang="en-US" baseline="-25000" dirty="0"/>
+          </a:p>
+        </p:txBody>
+      </p:sp>
+      <p:sp>
+        <p:nvSpPr>
+          <p:cNvPr id="59" name="Pfeil nach unten 105"/>
+          <p:cNvSpPr/>
+          <p:nvPr/>
+        </p:nvSpPr>
+        <p:spPr>
+          <a:xfrm>
+            <a:off x="9844342" y="4724400"/>
+            <a:ext cx="482600" cy="596900"/>
+          </a:xfrm>
+          <a:prstGeom prst="downArrow">
+            <a:avLst/>
+          </a:prstGeom>
+        </p:spPr>
+        <p:style>
+          <a:lnRef idx="1">
+            <a:schemeClr val="accent1"/>
+          </a:lnRef>
+          <a:fillRef idx="3">
+            <a:schemeClr val="accent1"/>
+          </a:fillRef>
+          <a:effectRef idx="2">
+            <a:schemeClr val="accent1"/>
+          </a:effectRef>
+          <a:fontRef idx="minor">
+            <a:schemeClr val="lt1"/>
+          </a:fontRef>
+        </p:style>
+        <p:txBody>
+          <a:bodyPr rtlCol="0" anchor="ctr"/>
+          <a:lstStyle/>
+          <a:p>
+            <a:pPr algn="ctr"/>
+            <a:endParaRPr lang="en-US"/>
+          </a:p>
+        </p:txBody>
+      </p:sp>
+      <p:sp>
+        <p:nvSpPr>
+          <p:cNvPr id="60" name="Textfeld 106"/>
+          <p:cNvSpPr txBox="1"/>
+          <p:nvPr/>
+        </p:nvSpPr>
+        <p:spPr>
+          <a:xfrm>
+            <a:off x="9526842" y="5410200"/>
             <a:ext cx="1019292" cy="369332"/>
           </a:xfrm>
           <a:prstGeom prst="rect">
@@ -5069,7 +5242,7 @@
   <a:extraClrSchemeLst/>
   <a:extLst>
     <a:ext uri="{05A4C25C-085E-4340-85A3-A5531E510DB2}">
-      <thm15:themeFamily xmlns:thm15="http://schemas.microsoft.com/office/thememl/2012/main" xmlns="" name="Office Theme" id="{62F939B6-93AF-4DB8-9C6B-D6C7DFDC589F}" vid="{4A3C46E8-61CC-4603-A589-7422A47A8E4A}"/>
+      <thm15:themeFamily xmlns:thm15="http://schemas.microsoft.com/office/thememl/2012/main" name="Office Theme" id="{62F939B6-93AF-4DB8-9C6B-D6C7DFDC589F}" vid="{4A3C46E8-61CC-4603-A589-7422A47A8E4A}"/>
     </a:ext>
   </a:extLst>
 </a:theme>

</xml_diff>